<commit_message>
fixed poster, and modified readme
</commit_message>
<xml_diff>
--- a/Project Files/POSTER/TEAM05_POSTER_FINAL.pptx
+++ b/Project Files/POSTER/TEAM05_POSTER_FINAL.pptx
@@ -107,6 +107,22 @@
       </a:defRPr>
     </a:lvl9pPr>
   </p:defaultTextStyle>
+  <p:extLst>
+    <p:ext uri="{EFAFB233-063F-42B5-8137-9DF3F51BA10A}">
+      <p15:sldGuideLst xmlns:p15="http://schemas.microsoft.com/office/powerpoint/2012/main">
+        <p15:guide id="1" orient="horz" pos="10369">
+          <p15:clr>
+            <a:srgbClr val="A4A3A4"/>
+          </p15:clr>
+        </p15:guide>
+        <p15:guide id="2" pos="13826">
+          <p15:clr>
+            <a:srgbClr val="A4A3A4"/>
+          </p15:clr>
+        </p15:guide>
+      </p15:sldGuideLst>
+    </p:ext>
+  </p:extLst>
 </p:presentation>
 </file>
 
@@ -192,7 +208,7 @@
           <a:p>
             <a:fld id="{8F83D281-2790-4738-85E3-6B5EF814E5F0}" type="datetimeFigureOut">
               <a:rPr lang="en-CA" smtClean="0"/>
-              <a:t>15-04-09</a:t>
+              <a:t>2018-03-14</a:t>
             </a:fld>
             <a:endParaRPr lang="en-CA"/>
           </a:p>
@@ -641,7 +657,7 @@
           <a:p>
             <a:fld id="{F07B2A3D-62F9-40D5-B997-5C406EEE223B}" type="datetimeFigureOut">
               <a:rPr lang="en-CA" smtClean="0"/>
-              <a:t>15-04-09</a:t>
+              <a:t>2018-03-14</a:t>
             </a:fld>
             <a:endParaRPr lang="en-CA"/>
           </a:p>
@@ -811,7 +827,7 @@
           <a:p>
             <a:fld id="{F07B2A3D-62F9-40D5-B997-5C406EEE223B}" type="datetimeFigureOut">
               <a:rPr lang="en-CA" smtClean="0"/>
-              <a:t>15-04-09</a:t>
+              <a:t>2018-03-14</a:t>
             </a:fld>
             <a:endParaRPr lang="en-CA"/>
           </a:p>
@@ -991,7 +1007,7 @@
           <a:p>
             <a:fld id="{F07B2A3D-62F9-40D5-B997-5C406EEE223B}" type="datetimeFigureOut">
               <a:rPr lang="en-CA" smtClean="0"/>
-              <a:t>15-04-09</a:t>
+              <a:t>2018-03-14</a:t>
             </a:fld>
             <a:endParaRPr lang="en-CA"/>
           </a:p>
@@ -1161,7 +1177,7 @@
           <a:p>
             <a:fld id="{F07B2A3D-62F9-40D5-B997-5C406EEE223B}" type="datetimeFigureOut">
               <a:rPr lang="en-CA" smtClean="0"/>
-              <a:t>15-04-09</a:t>
+              <a:t>2018-03-14</a:t>
             </a:fld>
             <a:endParaRPr lang="en-CA"/>
           </a:p>
@@ -1407,7 +1423,7 @@
           <a:p>
             <a:fld id="{F07B2A3D-62F9-40D5-B997-5C406EEE223B}" type="datetimeFigureOut">
               <a:rPr lang="en-CA" smtClean="0"/>
-              <a:t>15-04-09</a:t>
+              <a:t>2018-03-14</a:t>
             </a:fld>
             <a:endParaRPr lang="en-CA"/>
           </a:p>
@@ -1695,7 +1711,7 @@
           <a:p>
             <a:fld id="{F07B2A3D-62F9-40D5-B997-5C406EEE223B}" type="datetimeFigureOut">
               <a:rPr lang="en-CA" smtClean="0"/>
-              <a:t>15-04-09</a:t>
+              <a:t>2018-03-14</a:t>
             </a:fld>
             <a:endParaRPr lang="en-CA"/>
           </a:p>
@@ -2122,7 +2138,7 @@
           <a:p>
             <a:fld id="{F07B2A3D-62F9-40D5-B997-5C406EEE223B}" type="datetimeFigureOut">
               <a:rPr lang="en-CA" smtClean="0"/>
-              <a:t>15-04-09</a:t>
+              <a:t>2018-03-14</a:t>
             </a:fld>
             <a:endParaRPr lang="en-CA"/>
           </a:p>
@@ -2240,7 +2256,7 @@
           <a:p>
             <a:fld id="{F07B2A3D-62F9-40D5-B997-5C406EEE223B}" type="datetimeFigureOut">
               <a:rPr lang="en-CA" smtClean="0"/>
-              <a:t>15-04-09</a:t>
+              <a:t>2018-03-14</a:t>
             </a:fld>
             <a:endParaRPr lang="en-CA"/>
           </a:p>
@@ -2335,7 +2351,7 @@
           <a:p>
             <a:fld id="{F07B2A3D-62F9-40D5-B997-5C406EEE223B}" type="datetimeFigureOut">
               <a:rPr lang="en-CA" smtClean="0"/>
-              <a:t>15-04-09</a:t>
+              <a:t>2018-03-14</a:t>
             </a:fld>
             <a:endParaRPr lang="en-CA"/>
           </a:p>
@@ -2612,7 +2628,7 @@
           <a:p>
             <a:fld id="{F07B2A3D-62F9-40D5-B997-5C406EEE223B}" type="datetimeFigureOut">
               <a:rPr lang="en-CA" smtClean="0"/>
-              <a:t>15-04-09</a:t>
+              <a:t>2018-03-14</a:t>
             </a:fld>
             <a:endParaRPr lang="en-CA"/>
           </a:p>
@@ -2865,7 +2881,7 @@
           <a:p>
             <a:fld id="{F07B2A3D-62F9-40D5-B997-5C406EEE223B}" type="datetimeFigureOut">
               <a:rPr lang="en-CA" smtClean="0"/>
-              <a:t>15-04-09</a:t>
+              <a:t>2018-03-14</a:t>
             </a:fld>
             <a:endParaRPr lang="en-CA"/>
           </a:p>
@@ -3078,7 +3094,7 @@
           <a:p>
             <a:fld id="{F07B2A3D-62F9-40D5-B997-5C406EEE223B}" type="datetimeFigureOut">
               <a:rPr lang="en-CA" smtClean="0"/>
-              <a:t>15-04-09</a:t>
+              <a:t>2018-03-14</a:t>
             </a:fld>
             <a:endParaRPr lang="en-CA"/>
           </a:p>
@@ -3650,7 +3666,7 @@
           <a:noFill/>
           <a:extLst>
             <a:ext uri="{909E8E84-426E-40dd-AFC4-6F175D3DCCD1}">
-              <a14:hiddenFill xmlns:a14="http://schemas.microsoft.com/office/drawing/2010/main">
+              <a14:hiddenFill xmlns:a14="http://schemas.microsoft.com/office/drawing/2010/main" xmlns="">
                 <a:solidFill>
                   <a:srgbClr val="FFFFFF"/>
                 </a:solidFill>
@@ -3691,7 +3707,7 @@
           <a:noFill/>
           <a:extLst>
             <a:ext uri="{909E8E84-426E-40dd-AFC4-6F175D3DCCD1}">
-              <a14:hiddenFill xmlns:a14="http://schemas.microsoft.com/office/drawing/2010/main">
+              <a14:hiddenFill xmlns:a14="http://schemas.microsoft.com/office/drawing/2010/main" xmlns="">
                 <a:solidFill>
                   <a:srgbClr val="FFFFFF"/>
                 </a:solidFill>
@@ -3732,7 +3748,7 @@
           <a:noFill/>
           <a:extLst>
             <a:ext uri="{909E8E84-426E-40dd-AFC4-6F175D3DCCD1}">
-              <a14:hiddenFill xmlns:a14="http://schemas.microsoft.com/office/drawing/2010/main">
+              <a14:hiddenFill xmlns:a14="http://schemas.microsoft.com/office/drawing/2010/main" xmlns="">
                 <a:solidFill>
                   <a:srgbClr val="FFFFFF"/>
                 </a:solidFill>
@@ -3773,7 +3789,7 @@
           <a:noFill/>
           <a:extLst>
             <a:ext uri="{909E8E84-426E-40dd-AFC4-6F175D3DCCD1}">
-              <a14:hiddenFill xmlns:a14="http://schemas.microsoft.com/office/drawing/2010/main">
+              <a14:hiddenFill xmlns:a14="http://schemas.microsoft.com/office/drawing/2010/main" xmlns="">
                 <a:solidFill>
                   <a:srgbClr val="FFFFFF"/>
                 </a:solidFill>
@@ -3814,7 +3830,7 @@
           <a:noFill/>
           <a:extLst>
             <a:ext uri="{909E8E84-426E-40dd-AFC4-6F175D3DCCD1}">
-              <a14:hiddenFill xmlns:a14="http://schemas.microsoft.com/office/drawing/2010/main">
+              <a14:hiddenFill xmlns:a14="http://schemas.microsoft.com/office/drawing/2010/main" xmlns="">
                 <a:solidFill>
                   <a:srgbClr val="FFFFFF"/>
                 </a:solidFill>
@@ -3855,7 +3871,7 @@
           <a:noFill/>
           <a:extLst>
             <a:ext uri="{909E8E84-426E-40dd-AFC4-6F175D3DCCD1}">
-              <a14:hiddenFill xmlns:a14="http://schemas.microsoft.com/office/drawing/2010/main">
+              <a14:hiddenFill xmlns:a14="http://schemas.microsoft.com/office/drawing/2010/main" xmlns="">
                 <a:solidFill>
                   <a:srgbClr val="FFFFFF"/>
                 </a:solidFill>
@@ -3896,7 +3912,7 @@
           <a:noFill/>
           <a:extLst>
             <a:ext uri="{909E8E84-426E-40dd-AFC4-6F175D3DCCD1}">
-              <a14:hiddenFill xmlns:a14="http://schemas.microsoft.com/office/drawing/2010/main">
+              <a14:hiddenFill xmlns:a14="http://schemas.microsoft.com/office/drawing/2010/main" xmlns="">
                 <a:solidFill>
                   <a:srgbClr val="FFFFFF"/>
                 </a:solidFill>
@@ -3937,7 +3953,7 @@
           <a:noFill/>
           <a:extLst>
             <a:ext uri="{909E8E84-426E-40dd-AFC4-6F175D3DCCD1}">
-              <a14:hiddenFill xmlns:a14="http://schemas.microsoft.com/office/drawing/2010/main">
+              <a14:hiddenFill xmlns:a14="http://schemas.microsoft.com/office/drawing/2010/main" xmlns="">
                 <a:solidFill>
                   <a:srgbClr val="FFFFFF"/>
                 </a:solidFill>
@@ -3978,7 +3994,7 @@
           <a:noFill/>
           <a:extLst>
             <a:ext uri="{909E8E84-426E-40dd-AFC4-6F175D3DCCD1}">
-              <a14:hiddenFill xmlns:a14="http://schemas.microsoft.com/office/drawing/2010/main">
+              <a14:hiddenFill xmlns:a14="http://schemas.microsoft.com/office/drawing/2010/main" xmlns="">
                 <a:solidFill>
                   <a:srgbClr val="FFFFFF"/>
                 </a:solidFill>
@@ -4019,7 +4035,7 @@
           <a:noFill/>
           <a:extLst>
             <a:ext uri="{909E8E84-426E-40dd-AFC4-6F175D3DCCD1}">
-              <a14:hiddenFill xmlns:a14="http://schemas.microsoft.com/office/drawing/2010/main">
+              <a14:hiddenFill xmlns:a14="http://schemas.microsoft.com/office/drawing/2010/main" xmlns="">
                 <a:solidFill>
                   <a:srgbClr val="FFFFFF"/>
                 </a:solidFill>
@@ -6064,7 +6080,7 @@
           </a:effectLst>
           <a:extLst>
             <a:ext uri="{909E8E84-426E-40dd-AFC4-6F175D3DCCD1}">
-              <a14:hiddenFill xmlns:a14="http://schemas.microsoft.com/office/drawing/2010/main">
+              <a14:hiddenFill xmlns:a14="http://schemas.microsoft.com/office/drawing/2010/main" xmlns="">
                 <a:solidFill>
                   <a:srgbClr val="FFFFFF"/>
                 </a:solidFill>
@@ -6197,7 +6213,7 @@
           <a:noFill/>
           <a:extLst>
             <a:ext uri="{909E8E84-426E-40dd-AFC4-6F175D3DCCD1}">
-              <a14:hiddenFill xmlns:a14="http://schemas.microsoft.com/office/drawing/2010/main">
+              <a14:hiddenFill xmlns:a14="http://schemas.microsoft.com/office/drawing/2010/main" xmlns="">
                 <a:solidFill>
                   <a:srgbClr val="FFFFFF"/>
                 </a:solidFill>
@@ -6406,13 +6422,7 @@
               <a:rPr lang="en-CA" sz="3600" dirty="0" smtClean="0">
                 <a:latin typeface="Footlight MT Light" pitchFamily="18" charset="0"/>
               </a:rPr>
-              <a:t>urrounding </a:t>
-            </a:r>
-            <a:r>
-              <a:rPr lang="en-CA" sz="3600" dirty="0" smtClean="0">
-                <a:latin typeface="Footlight MT Light" pitchFamily="18" charset="0"/>
-              </a:rPr>
-              <a:t>and detects for the</a:t>
+              <a:t>urrounding and detects for the</a:t>
             </a:r>
           </a:p>
           <a:p>
@@ -6486,7 +6496,7 @@
           <a:noFill/>
           <a:extLst>
             <a:ext uri="{909E8E84-426E-40dd-AFC4-6F175D3DCCD1}">
-              <a14:hiddenFill xmlns:a14="http://schemas.microsoft.com/office/drawing/2010/main">
+              <a14:hiddenFill xmlns:a14="http://schemas.microsoft.com/office/drawing/2010/main" xmlns="">
                 <a:solidFill>
                   <a:srgbClr val="FFFFFF"/>
                 </a:solidFill>
@@ -6527,7 +6537,7 @@
           <a:noFill/>
           <a:extLst>
             <a:ext uri="{909E8E84-426E-40dd-AFC4-6F175D3DCCD1}">
-              <a14:hiddenFill xmlns:a14="http://schemas.microsoft.com/office/drawing/2010/main">
+              <a14:hiddenFill xmlns:a14="http://schemas.microsoft.com/office/drawing/2010/main" xmlns="">
                 <a:solidFill>
                   <a:srgbClr val="FFFFFF"/>
                 </a:solidFill>
@@ -6568,7 +6578,7 @@
           <a:noFill/>
           <a:extLst>
             <a:ext uri="{909E8E84-426E-40dd-AFC4-6F175D3DCCD1}">
-              <a14:hiddenFill xmlns:a14="http://schemas.microsoft.com/office/drawing/2010/main">
+              <a14:hiddenFill xmlns:a14="http://schemas.microsoft.com/office/drawing/2010/main" xmlns="">
                 <a:solidFill>
                   <a:srgbClr val="FFFFFF"/>
                 </a:solidFill>
@@ -6609,7 +6619,7 @@
           <a:noFill/>
           <a:extLst>
             <a:ext uri="{909E8E84-426E-40dd-AFC4-6F175D3DCCD1}">
-              <a14:hiddenFill xmlns:a14="http://schemas.microsoft.com/office/drawing/2010/main">
+              <a14:hiddenFill xmlns:a14="http://schemas.microsoft.com/office/drawing/2010/main" xmlns="">
                 <a:solidFill>
                   <a:srgbClr val="FFFFFF"/>
                 </a:solidFill>
@@ -6650,7 +6660,7 @@
           <a:noFill/>
           <a:extLst>
             <a:ext uri="{909E8E84-426E-40dd-AFC4-6F175D3DCCD1}">
-              <a14:hiddenFill xmlns:a14="http://schemas.microsoft.com/office/drawing/2010/main">
+              <a14:hiddenFill xmlns:a14="http://schemas.microsoft.com/office/drawing/2010/main" xmlns="">
                 <a:solidFill>
                   <a:srgbClr val="FFFFFF"/>
                 </a:solidFill>
@@ -6806,7 +6816,7 @@
           <a:noFill/>
           <a:extLst>
             <a:ext uri="{909E8E84-426E-40dd-AFC4-6F175D3DCCD1}">
-              <a14:hiddenFill xmlns:a14="http://schemas.microsoft.com/office/drawing/2010/main">
+              <a14:hiddenFill xmlns:a14="http://schemas.microsoft.com/office/drawing/2010/main" xmlns="">
                 <a:solidFill>
                   <a:srgbClr val="FFFFFF"/>
                 </a:solidFill>
@@ -6995,7 +7005,7 @@
           </a:scene3d>
           <a:extLst>
             <a:ext uri="{909E8E84-426E-40dd-AFC4-6F175D3DCCD1}">
-              <a14:hiddenFill xmlns:a14="http://schemas.microsoft.com/office/drawing/2010/main">
+              <a14:hiddenFill xmlns:a14="http://schemas.microsoft.com/office/drawing/2010/main" xmlns="">
                 <a:solidFill>
                   <a:srgbClr val="FFFFFF"/>
                 </a:solidFill>
@@ -7363,7 +7373,7 @@
           </a:effectLst>
           <a:extLst>
             <a:ext uri="{909E8E84-426E-40dd-AFC4-6F175D3DCCD1}">
-              <a14:hiddenFill xmlns:a14="http://schemas.microsoft.com/office/drawing/2010/main">
+              <a14:hiddenFill xmlns:a14="http://schemas.microsoft.com/office/drawing/2010/main" xmlns="">
                 <a:solidFill>
                   <a:srgbClr val="FFFFFF"/>
                 </a:solidFill>
@@ -10734,7 +10744,7 @@
           <a:noFill/>
           <a:extLst>
             <a:ext uri="{909E8E84-426E-40dd-AFC4-6F175D3DCCD1}">
-              <a14:hiddenFill xmlns:a14="http://schemas.microsoft.com/office/drawing/2010/main">
+              <a14:hiddenFill xmlns:a14="http://schemas.microsoft.com/office/drawing/2010/main" xmlns="">
                 <a:solidFill>
                   <a:srgbClr val="FFFFFF"/>
                 </a:solidFill>
@@ -11073,7 +11083,7 @@
           </a:effectLst>
           <a:extLst>
             <a:ext uri="{909E8E84-426E-40dd-AFC4-6F175D3DCCD1}">
-              <a14:hiddenFill xmlns:a14="http://schemas.microsoft.com/office/drawing/2010/main">
+              <a14:hiddenFill xmlns:a14="http://schemas.microsoft.com/office/drawing/2010/main" xmlns="">
                 <a:solidFill>
                   <a:srgbClr val="FFFFFF"/>
                 </a:solidFill>
@@ -12749,7 +12759,7 @@
           </a:effectLst>
           <a:extLst>
             <a:ext uri="{909E8E84-426E-40dd-AFC4-6F175D3DCCD1}">
-              <a14:hiddenFill xmlns:a14="http://schemas.microsoft.com/office/drawing/2010/main">
+              <a14:hiddenFill xmlns:a14="http://schemas.microsoft.com/office/drawing/2010/main" xmlns="">
                 <a:solidFill>
                   <a:srgbClr val="FFFFFF"/>
                 </a:solidFill>
@@ -12797,7 +12807,7 @@
           </a:effectLst>
           <a:extLst>
             <a:ext uri="{909E8E84-426E-40dd-AFC4-6F175D3DCCD1}">
-              <a14:hiddenFill xmlns:a14="http://schemas.microsoft.com/office/drawing/2010/main">
+              <a14:hiddenFill xmlns:a14="http://schemas.microsoft.com/office/drawing/2010/main" xmlns="">
                 <a:solidFill>
                   <a:srgbClr val="FFFFFF"/>
                 </a:solidFill>
@@ -12845,7 +12855,7 @@
           </a:effectLst>
           <a:extLst>
             <a:ext uri="{909E8E84-426E-40dd-AFC4-6F175D3DCCD1}">
-              <a14:hiddenFill xmlns:a14="http://schemas.microsoft.com/office/drawing/2010/main">
+              <a14:hiddenFill xmlns:a14="http://schemas.microsoft.com/office/drawing/2010/main" xmlns="">
                 <a:solidFill>
                   <a:srgbClr val="FFFFFF"/>
                 </a:solidFill>
@@ -12886,7 +12896,7 @@
           <a:noFill/>
           <a:extLst>
             <a:ext uri="{909E8E84-426E-40dd-AFC4-6F175D3DCCD1}">
-              <a14:hiddenFill xmlns:a14="http://schemas.microsoft.com/office/drawing/2010/main">
+              <a14:hiddenFill xmlns:a14="http://schemas.microsoft.com/office/drawing/2010/main" xmlns="">
                 <a:solidFill>
                   <a:srgbClr val="FFFFFF"/>
                 </a:solidFill>
@@ -13004,19 +13014,7 @@
               <a:rPr lang="en-CA" sz="3600" dirty="0" smtClean="0">
                 <a:latin typeface="Footlight MT Light" panose="0204060206030A020304" pitchFamily="18" charset="0"/>
               </a:rPr>
-              <a:t> </a:t>
-            </a:r>
-            <a:r>
-              <a:rPr lang="en-CA" sz="3600" dirty="0" smtClean="0">
-                <a:latin typeface="Footlight MT Light" panose="0204060206030A020304" pitchFamily="18" charset="0"/>
-              </a:rPr>
-              <a:t>is </a:t>
-            </a:r>
-            <a:r>
-              <a:rPr lang="en-CA" sz="3600" dirty="0" smtClean="0">
-                <a:latin typeface="Footlight MT Light" panose="0204060206030A020304" pitchFamily="18" charset="0"/>
-              </a:rPr>
-              <a:t>able to accomplish some fantastic tasks by the application of engineering principles. </a:t>
+              <a:t> is able to accomplish some fantastic tasks by the application of engineering principles. </a:t>
             </a:r>
             <a:endParaRPr lang="en-CA" sz="3600" dirty="0">
               <a:latin typeface="Footlight MT Light" panose="0204060206030A020304" pitchFamily="18" charset="0"/>
@@ -13218,13 +13216,7 @@
               <a:rPr lang="en-CA" sz="3600" b="1" dirty="0" smtClean="0">
                 <a:latin typeface="Footlight MT Light" panose="0204060206030A020304" pitchFamily="18" charset="0"/>
               </a:rPr>
-              <a:t>load </a:t>
-            </a:r>
-            <a:r>
-              <a:rPr lang="en-CA" sz="3600" b="1" dirty="0" smtClean="0">
-                <a:latin typeface="Footlight MT Light" panose="0204060206030A020304" pitchFamily="18" charset="0"/>
-              </a:rPr>
-              <a:t>automatically </a:t>
+              <a:t>load automatically </a:t>
             </a:r>
             <a:r>
               <a:rPr lang="en-CA" sz="3600" dirty="0" smtClean="0">
@@ -14286,7 +14278,7 @@
           <a:noFill/>
           <a:extLst>
             <a:ext uri="{909E8E84-426E-40dd-AFC4-6F175D3DCCD1}">
-              <a14:hiddenFill xmlns:a14="http://schemas.microsoft.com/office/drawing/2010/main">
+              <a14:hiddenFill xmlns:a14="http://schemas.microsoft.com/office/drawing/2010/main" xmlns="">
                 <a:solidFill>
                   <a:srgbClr val="FFFFFF"/>
                 </a:solidFill>
@@ -14359,7 +14351,7 @@
           <a:noFill/>
           <a:extLst>
             <a:ext uri="{909E8E84-426E-40dd-AFC4-6F175D3DCCD1}">
-              <a14:hiddenFill xmlns:a14="http://schemas.microsoft.com/office/drawing/2010/main">
+              <a14:hiddenFill xmlns:a14="http://schemas.microsoft.com/office/drawing/2010/main" xmlns="">
                 <a:solidFill>
                   <a:srgbClr val="FFFFFF"/>
                 </a:solidFill>
@@ -14808,14 +14800,21 @@
                 <a:latin typeface="Footlight MT Light"/>
                 <a:cs typeface="Footlight MT Light"/>
               </a:rPr>
-              <a:t> – </a:t>
-            </a:r>
-            <a:r>
-              <a:rPr lang="en-US" sz="3600" dirty="0" err="1" smtClean="0">
+              <a:t> </a:t>
+            </a:r>
+            <a:r>
+              <a:rPr lang="en-US" sz="3600" smtClean="0">
                 <a:latin typeface="Footlight MT Light"/>
                 <a:cs typeface="Footlight MT Light"/>
               </a:rPr>
-              <a:t>Sofware</a:t>
+              <a:t>– </a:t>
+            </a:r>
+            <a:r>
+              <a:rPr lang="en-US" sz="3600" smtClean="0">
+                <a:latin typeface="Footlight MT Light"/>
+                <a:cs typeface="Footlight MT Light"/>
+              </a:rPr>
+              <a:t>Software</a:t>
             </a:r>
             <a:endParaRPr lang="en-US" sz="3600" dirty="0" smtClean="0">
               <a:latin typeface="Footlight MT Light"/>
@@ -14922,7 +14921,7 @@
   <p:timing>
     <p:tnLst>
       <p:par>
-        <p:cTn xmlns:p14="http://schemas.microsoft.com/office/powerpoint/2010/main" id="1" dur="indefinite" restart="never" nodeType="tmRoot"/>
+        <p:cTn id="1" dur="indefinite" restart="never" nodeType="tmRoot"/>
       </p:par>
     </p:tnLst>
   </p:timing>

</xml_diff>